<commit_message>
Database views created, Views updated
</commit_message>
<xml_diff>
--- a/Projektarbeit_New/Documents/Gruppenarbeit m151.pptx
+++ b/Projektarbeit_New/Documents/Gruppenarbeit m151.pptx
@@ -356,7 +356,7 @@
           <a:p>
             <a:fld id="{ED291B17-9318-49DB-B28B-6E5994AE9581}" type="datetime1">
               <a:rPr lang="en-US" smtClean="0"/>
-              <a:t>2/3/2021</a:t>
+              <a:t>2/4/2021</a:t>
             </a:fld>
             <a:endParaRPr lang="en-US" dirty="0"/>
           </a:p>
@@ -559,7 +559,7 @@
           <a:p>
             <a:fld id="{2CED4963-E985-44C4-B8C4-FDD613B7C2F8}" type="datetime1">
               <a:rPr lang="en-US" smtClean="0"/>
-              <a:t>2/3/2021</a:t>
+              <a:t>2/4/2021</a:t>
             </a:fld>
             <a:endParaRPr lang="en-US" dirty="0"/>
           </a:p>
@@ -921,7 +921,7 @@
           <a:p>
             <a:fld id="{ED291B17-9318-49DB-B28B-6E5994AE9581}" type="datetime1">
               <a:rPr lang="en-US" smtClean="0"/>
-              <a:t>2/3/2021</a:t>
+              <a:t>2/4/2021</a:t>
             </a:fld>
             <a:endParaRPr lang="en-US" dirty="0"/>
           </a:p>
@@ -1119,7 +1119,7 @@
           <a:p>
             <a:fld id="{78DD82B9-B8EE-4375-B6FF-88FA6ABB15D9}" type="datetime1">
               <a:rPr lang="en-US" smtClean="0"/>
-              <a:t>2/3/2021</a:t>
+              <a:t>2/4/2021</a:t>
             </a:fld>
             <a:endParaRPr lang="en-US" dirty="0"/>
           </a:p>
@@ -1431,7 +1431,7 @@
           <a:p>
             <a:fld id="{B2497495-0637-405E-AE64-5CC7506D51F5}" type="datetime1">
               <a:rPr lang="en-US" smtClean="0"/>
-              <a:t>2/3/2021</a:t>
+              <a:t>2/4/2021</a:t>
             </a:fld>
             <a:endParaRPr lang="en-US" dirty="0"/>
           </a:p>
@@ -1684,7 +1684,7 @@
           <a:p>
             <a:fld id="{7BFFD690-9426-415D-8B65-26881E07B2D4}" type="datetime1">
               <a:rPr lang="en-US" smtClean="0"/>
-              <a:t>2/3/2021</a:t>
+              <a:t>2/4/2021</a:t>
             </a:fld>
             <a:endParaRPr lang="en-US" dirty="0"/>
           </a:p>
@@ -2106,7 +2106,7 @@
           <a:p>
             <a:fld id="{04C4989A-474C-40DE-95B9-011C28B71673}" type="datetime1">
               <a:rPr lang="en-US" smtClean="0"/>
-              <a:t>2/3/2021</a:t>
+              <a:t>2/4/2021</a:t>
             </a:fld>
             <a:endParaRPr lang="en-US" dirty="0"/>
           </a:p>
@@ -2229,7 +2229,7 @@
           <a:p>
             <a:fld id="{5DB4ED54-5B5E-4A04-93D3-5772E3CE3818}" type="datetime1">
               <a:rPr lang="en-US" smtClean="0"/>
-              <a:t>2/3/2021</a:t>
+              <a:t>2/4/2021</a:t>
             </a:fld>
             <a:endParaRPr lang="en-US" dirty="0"/>
           </a:p>
@@ -2324,7 +2324,7 @@
           <a:p>
             <a:fld id="{4EDE50D6-574B-40AF-946F-D52A04ADE379}" type="datetime1">
               <a:rPr lang="en-US" smtClean="0"/>
-              <a:t>2/3/2021</a:t>
+              <a:t>2/4/2021</a:t>
             </a:fld>
             <a:endParaRPr lang="en-US" dirty="0"/>
           </a:p>
@@ -2701,7 +2701,7 @@
           <a:p>
             <a:fld id="{D82884F1-FFEA-405F-9602-3DCA865EDA4E}" type="datetime1">
               <a:rPr lang="en-US" smtClean="0"/>
-              <a:t>2/3/2021</a:t>
+              <a:t>2/4/2021</a:t>
             </a:fld>
             <a:endParaRPr lang="en-US" dirty="0"/>
           </a:p>
@@ -2994,7 +2994,7 @@
           <a:p>
             <a:fld id="{7E18DB4A-8810-4A10-AD5C-D5E2C667F5B3}" type="datetime1">
               <a:rPr lang="en-US" smtClean="0"/>
-              <a:t>2/3/2021</a:t>
+              <a:t>2/4/2021</a:t>
             </a:fld>
             <a:endParaRPr lang="en-US" dirty="0"/>
           </a:p>
@@ -3209,7 +3209,7 @@
           <a:p>
             <a:fld id="{ED291B17-9318-49DB-B28B-6E5994AE9581}" type="datetime1">
               <a:rPr lang="en-US" smtClean="0"/>
-              <a:t>2/3/2021</a:t>
+              <a:t>2/4/2021</a:t>
             </a:fld>
             <a:endParaRPr lang="en-US" dirty="0"/>
           </a:p>
@@ -4177,41 +4177,48 @@
           <a:p>
             <a:r>
               <a:rPr lang="de-CH" dirty="0"/>
-              <a:t>Vorgehen / Arbeitsplanung und </a:t>
-            </a:r>
-            <a:r>
-              <a:rPr lang="de-CH" dirty="0" err="1"/>
-              <a:t>aufteilung</a:t>
-            </a:r>
-            <a:endParaRPr lang="de-CH" dirty="0"/>
-          </a:p>
-        </p:txBody>
-      </p:sp>
-      <p:sp>
-        <p:nvSpPr>
-          <p:cNvPr id="3" name="Inhaltsplatzhalter 2">
+              <a:t>Vorgehen / Arbeitsplanung und Aufteilung</a:t>
+            </a:r>
+          </a:p>
+        </p:txBody>
+      </p:sp>
+      <p:pic>
+        <p:nvPicPr>
+          <p:cNvPr id="5" name="Inhaltsplatzhalter 4">
             <a:extLst>
               <a:ext uri="{FF2B5EF4-FFF2-40B4-BE49-F238E27FC236}">
-                <a16:creationId xmlns:a16="http://schemas.microsoft.com/office/drawing/2014/main" id="{471C0A83-C29C-480F-ADF4-F3C30F875677}"/>
+                <a16:creationId xmlns:a16="http://schemas.microsoft.com/office/drawing/2014/main" id="{7BCD17C9-C951-4448-AB67-94D2D012DB4E}"/>
               </a:ext>
             </a:extLst>
           </p:cNvPr>
-          <p:cNvSpPr>
-            <a:spLocks noGrp="1"/>
-          </p:cNvSpPr>
+          <p:cNvPicPr>
+            <a:picLocks noGrp="1"/>
+          </p:cNvPicPr>
           <p:nvPr>
             <p:ph idx="1"/>
           </p:nvPr>
-        </p:nvSpPr>
-        <p:spPr/>
-        <p:txBody>
-          <a:bodyPr/>
-          <a:lstStyle/>
-          <a:p>
-            <a:endParaRPr lang="de-CH" dirty="0"/>
-          </a:p>
-        </p:txBody>
-      </p:sp>
+        </p:nvPicPr>
+        <p:blipFill>
+          <a:blip r:embed="rId2"/>
+          <a:stretch>
+            <a:fillRect/>
+          </a:stretch>
+        </p:blipFill>
+        <p:spPr>
+          <a:xfrm>
+            <a:off x="2957125" y="2341563"/>
+            <a:ext cx="6277749" cy="3633787"/>
+          </a:xfrm>
+          <a:prstGeom prst="rect">
+            <a:avLst/>
+          </a:prstGeom>
+          <a:ln>
+            <a:solidFill>
+              <a:schemeClr val="tx1"/>
+            </a:solidFill>
+          </a:ln>
+        </p:spPr>
+      </p:pic>
     </p:spTree>
     <p:extLst>
       <p:ext uri="{BB962C8B-B14F-4D97-AF65-F5344CB8AC3E}">
@@ -4291,7 +4298,7 @@
           <a:bodyPr/>
           <a:lstStyle/>
           <a:p>
-            <a:endParaRPr lang="de-CH"/>
+            <a:endParaRPr lang="de-CH" dirty="0"/>
           </a:p>
         </p:txBody>
       </p:sp>
@@ -4379,7 +4386,7 @@
           <a:bodyPr/>
           <a:lstStyle/>
           <a:p>
-            <a:endParaRPr lang="de-CH"/>
+            <a:endParaRPr lang="de-CH" dirty="0"/>
           </a:p>
         </p:txBody>
       </p:sp>
@@ -4463,7 +4470,31 @@
           <a:bodyPr/>
           <a:lstStyle/>
           <a:p>
-            <a:endParaRPr lang="de-CH"/>
+            <a:r>
+              <a:rPr lang="de-CH" dirty="0" err="1"/>
+              <a:t>Webseit</a:t>
+            </a:r>
+            <a:r>
+              <a:rPr lang="de-CH" dirty="0"/>
+              <a:t> </a:t>
+            </a:r>
+            <a:r>
+              <a:rPr lang="de-CH" dirty="0" err="1"/>
+              <a:t>gestelten</a:t>
+            </a:r>
+            <a:endParaRPr lang="de-CH" dirty="0"/>
+          </a:p>
+          <a:p>
+            <a:r>
+              <a:rPr lang="de-CH" dirty="0"/>
+              <a:t>Model</a:t>
+            </a:r>
+          </a:p>
+          <a:p>
+            <a:r>
+              <a:rPr lang="de-CH" dirty="0"/>
+              <a:t>Controller</a:t>
+            </a:r>
           </a:p>
         </p:txBody>
       </p:sp>
@@ -4547,7 +4578,10 @@
           <a:bodyPr/>
           <a:lstStyle/>
           <a:p>
-            <a:endParaRPr lang="de-CH"/>
+            <a:r>
+              <a:rPr lang="de-CH" dirty="0"/>
+              <a:t>NP: </a:t>
+            </a:r>
           </a:p>
         </p:txBody>
       </p:sp>

</xml_diff>